<commit_message>
Added slide for Q#-9
</commit_message>
<xml_diff>
--- a/CastStudy1_MSDS6306_Budweiser_firstdraft.pptx
+++ b/CastStudy1_MSDS6306_Budweiser_firstdraft.pptx
@@ -12,6 +12,7 @@
     <p:sldId id="260" r:id="rId6"/>
     <p:sldId id="261" r:id="rId7"/>
     <p:sldId id="262" r:id="rId8"/>
+    <p:sldId id="263" r:id="rId9"/>
   </p:sldIdLst>
   <p:sldSz cx="12192000" cy="6858000"/>
   <p:notesSz cx="6858000" cy="9144000"/>
@@ -265,7 +266,7 @@
           <a:p>
             <a:fld id="{78ABE3C1-DBE1-495D-B57B-2849774B866A}" type="datetimeFigureOut">
               <a:rPr lang="en-US" smtClean="0"/>
-              <a:t>2/20/2021</a:t>
+              <a:t>2/22/2021</a:t>
             </a:fld>
             <a:endParaRPr lang="en-US" dirty="0"/>
           </a:p>
@@ -463,7 +464,7 @@
           <a:p>
             <a:fld id="{1FA3F48C-C7C6-4055-9F49-3777875E72AE}" type="datetimeFigureOut">
               <a:rPr lang="en-US" smtClean="0"/>
-              <a:t>2/20/2021</a:t>
+              <a:t>2/22/2021</a:t>
             </a:fld>
             <a:endParaRPr lang="en-US" dirty="0"/>
           </a:p>
@@ -671,7 +672,7 @@
           <a:p>
             <a:fld id="{6178E61D-D431-422C-9764-11DAFE33AB63}" type="datetimeFigureOut">
               <a:rPr lang="en-US" smtClean="0"/>
-              <a:t>2/20/2021</a:t>
+              <a:t>2/22/2021</a:t>
             </a:fld>
             <a:endParaRPr lang="en-US" dirty="0"/>
           </a:p>
@@ -870,7 +871,7 @@
           <a:p>
             <a:fld id="{12DE42F4-6EEF-4EF7-8ED4-2208F0F89A08}" type="datetimeFigureOut">
               <a:rPr lang="en-US" smtClean="0"/>
-              <a:t>2/20/2021</a:t>
+              <a:t>2/22/2021</a:t>
             </a:fld>
             <a:endParaRPr lang="en-US" dirty="0"/>
           </a:p>
@@ -1145,7 +1146,7 @@
           <a:p>
             <a:fld id="{30578ACC-22D6-47C1-A373-4FD133E34F3C}" type="datetimeFigureOut">
               <a:rPr lang="en-US" smtClean="0"/>
-              <a:t>2/20/2021</a:t>
+              <a:t>2/22/2021</a:t>
             </a:fld>
             <a:endParaRPr lang="en-US" dirty="0"/>
           </a:p>
@@ -1410,7 +1411,7 @@
           <a:p>
             <a:fld id="{4E5A6C69-6797-4E8A-BF37-F2C3751466E9}" type="datetimeFigureOut">
               <a:rPr lang="en-US" smtClean="0"/>
-              <a:t>2/20/2021</a:t>
+              <a:t>2/22/2021</a:t>
             </a:fld>
             <a:endParaRPr lang="en-US" dirty="0"/>
           </a:p>
@@ -1822,7 +1823,7 @@
           <a:p>
             <a:fld id="{D82014A1-A632-4878-A0D3-F52BA7563730}" type="datetimeFigureOut">
               <a:rPr lang="en-US" smtClean="0"/>
-              <a:t>2/20/2021</a:t>
+              <a:t>2/22/2021</a:t>
             </a:fld>
             <a:endParaRPr lang="en-US" dirty="0"/>
           </a:p>
@@ -1963,7 +1964,7 @@
           <a:p>
             <a:fld id="{CE99F462-093F-4566-844B-4C71F2739DA5}" type="datetimeFigureOut">
               <a:rPr lang="en-US" smtClean="0"/>
-              <a:t>2/20/2021</a:t>
+              <a:t>2/22/2021</a:t>
             </a:fld>
             <a:endParaRPr lang="en-US" dirty="0"/>
           </a:p>
@@ -2076,7 +2077,7 @@
           <a:p>
             <a:fld id="{3D24A7AC-904D-4781-85BA-7D10C17ED021}" type="datetimeFigureOut">
               <a:rPr lang="en-US" smtClean="0"/>
-              <a:t>2/20/2021</a:t>
+              <a:t>2/22/2021</a:t>
             </a:fld>
             <a:endParaRPr lang="en-US" dirty="0"/>
           </a:p>
@@ -2387,7 +2388,7 @@
           <a:p>
             <a:fld id="{E331444B-B92B-4E27-8C94-BB93EAF5CB18}" type="datetimeFigureOut">
               <a:rPr lang="en-US" smtClean="0"/>
-              <a:t>2/20/2021</a:t>
+              <a:t>2/22/2021</a:t>
             </a:fld>
             <a:endParaRPr lang="en-US" dirty="0"/>
           </a:p>
@@ -2675,7 +2676,7 @@
           <a:p>
             <a:fld id="{363EFA5E-FA76-400D-B3DC-F0BA90E6D107}" type="datetimeFigureOut">
               <a:rPr lang="en-US" smtClean="0"/>
-              <a:t>2/20/2021</a:t>
+              <a:t>2/22/2021</a:t>
             </a:fld>
             <a:endParaRPr lang="en-US" dirty="0"/>
           </a:p>
@@ -2946,7 +2947,7 @@
           <a:p>
             <a:fld id="{9D6E9DEC-419B-4CC5-A080-3B06BD5A8291}" type="datetimeFigureOut">
               <a:rPr lang="en-US" smtClean="0"/>
-              <a:t>2/20/2021</a:t>
+              <a:t>2/22/2021</a:t>
             </a:fld>
             <a:endParaRPr lang="en-US" dirty="0"/>
           </a:p>
@@ -4439,6 +4440,150 @@
 </p:sld>
 </file>
 
+<file path=ppt/slides/slide8.xml><?xml version="1.0" encoding="utf-8"?>
+<p:sld xmlns:a="http://schemas.openxmlformats.org/drawingml/2006/main" xmlns:r="http://schemas.openxmlformats.org/officeDocument/2006/relationships" xmlns:p="http://schemas.openxmlformats.org/presentationml/2006/main">
+  <p:cSld>
+    <p:spTree>
+      <p:nvGrpSpPr>
+        <p:cNvPr id="1" name=""/>
+        <p:cNvGrpSpPr/>
+        <p:nvPr/>
+      </p:nvGrpSpPr>
+      <p:grpSpPr>
+        <a:xfrm>
+          <a:off x="0" y="0"/>
+          <a:ext cx="0" cy="0"/>
+          <a:chOff x="0" y="0"/>
+          <a:chExt cx="0" cy="0"/>
+        </a:xfrm>
+      </p:grpSpPr>
+      <p:sp>
+        <p:nvSpPr>
+          <p:cNvPr id="2" name="Title 1">
+            <a:extLst>
+              <a:ext uri="{FF2B5EF4-FFF2-40B4-BE49-F238E27FC236}">
+                <a16:creationId xmlns:a16="http://schemas.microsoft.com/office/drawing/2014/main" id="{D6FD2369-CA21-4D69-A7C6-3C7BA5802D55}"/>
+              </a:ext>
+            </a:extLst>
+          </p:cNvPr>
+          <p:cNvSpPr>
+            <a:spLocks noGrp="1"/>
+          </p:cNvSpPr>
+          <p:nvPr>
+            <p:ph type="title"/>
+          </p:nvPr>
+        </p:nvSpPr>
+        <p:spPr/>
+        <p:txBody>
+          <a:bodyPr/>
+          <a:lstStyle/>
+          <a:p>
+            <a:r>
+              <a:rPr lang="en-US" dirty="0">
+                <a:solidFill>
+                  <a:schemeClr val="bg1">
+                    <a:lumMod val="95000"/>
+                  </a:schemeClr>
+                </a:solidFill>
+              </a:rPr>
+              <a:t>one other useful inference</a:t>
+            </a:r>
+            <a:endParaRPr lang="en-US" dirty="0"/>
+          </a:p>
+        </p:txBody>
+      </p:sp>
+      <p:sp>
+        <p:nvSpPr>
+          <p:cNvPr id="3" name="Content Placeholder 2">
+            <a:extLst>
+              <a:ext uri="{FF2B5EF4-FFF2-40B4-BE49-F238E27FC236}">
+                <a16:creationId xmlns:a16="http://schemas.microsoft.com/office/drawing/2014/main" id="{613D6CB1-0382-4B89-A846-0BC5CE767C6A}"/>
+              </a:ext>
+            </a:extLst>
+          </p:cNvPr>
+          <p:cNvSpPr>
+            <a:spLocks noGrp="1"/>
+          </p:cNvSpPr>
+          <p:nvPr>
+            <p:ph sz="half" idx="1"/>
+          </p:nvPr>
+        </p:nvSpPr>
+        <p:spPr/>
+        <p:txBody>
+          <a:bodyPr>
+            <a:normAutofit fontScale="92500" lnSpcReduction="10000"/>
+          </a:bodyPr>
+          <a:lstStyle/>
+          <a:p>
+            <a:r>
+              <a:rPr lang="en-US" dirty="0">
+                <a:solidFill>
+                  <a:schemeClr val="bg1"/>
+                </a:solidFill>
+              </a:rPr>
+              <a:t>Given this graph we can see that there are different styles in each state.</a:t>
+            </a:r>
+          </a:p>
+          <a:p>
+            <a:r>
+              <a:rPr lang="en-US" dirty="0">
+                <a:solidFill>
+                  <a:schemeClr val="bg1"/>
+                </a:solidFill>
+              </a:rPr>
+              <a:t>From the study we can see that There are various kind of Brew in different states. One Brew may be popular in one states, may not be poplar in another. This study will help companies to increase their production in states where the brand is famous. This also help to balance demand and supply curve and improve production capacity.</a:t>
+            </a:r>
+          </a:p>
+          <a:p>
+            <a:endParaRPr lang="en-US" dirty="0"/>
+          </a:p>
+        </p:txBody>
+      </p:sp>
+      <p:pic>
+        <p:nvPicPr>
+          <p:cNvPr id="6" name="Content Placeholder 5">
+            <a:extLst>
+              <a:ext uri="{FF2B5EF4-FFF2-40B4-BE49-F238E27FC236}">
+                <a16:creationId xmlns:a16="http://schemas.microsoft.com/office/drawing/2014/main" id="{126E1131-2CE1-4C29-91B3-1B21503D9BCF}"/>
+              </a:ext>
+            </a:extLst>
+          </p:cNvPr>
+          <p:cNvPicPr>
+            <a:picLocks noGrp="1" noChangeAspect="1"/>
+          </p:cNvPicPr>
+          <p:nvPr>
+            <p:ph sz="half" idx="2"/>
+          </p:nvPr>
+        </p:nvPicPr>
+        <p:blipFill>
+          <a:blip r:embed="rId2"/>
+          <a:stretch>
+            <a:fillRect/>
+          </a:stretch>
+        </p:blipFill>
+        <p:spPr>
+          <a:xfrm>
+            <a:off x="6604820" y="1555486"/>
+            <a:ext cx="5181600" cy="4282016"/>
+          </a:xfrm>
+          <a:prstGeom prst="rect">
+            <a:avLst/>
+          </a:prstGeom>
+        </p:spPr>
+      </p:pic>
+    </p:spTree>
+    <p:extLst>
+      <p:ext uri="{BB962C8B-B14F-4D97-AF65-F5344CB8AC3E}">
+        <p14:creationId xmlns:p14="http://schemas.microsoft.com/office/powerpoint/2010/main" val="2498056736"/>
+      </p:ext>
+    </p:extLst>
+  </p:cSld>
+  <p:clrMapOvr>
+    <a:masterClrMapping/>
+  </p:clrMapOvr>
+</p:sld>
+</file>
+
 <file path=ppt/theme/theme1.xml><?xml version="1.0" encoding="utf-8"?>
 <a:theme xmlns:a="http://schemas.openxmlformats.org/drawingml/2006/main" name="Office Theme">
   <a:themeElements>

</xml_diff>